<commit_message>
Fixed problems in self test that Josefine identified.
</commit_message>
<xml_diff>
--- a/Channels/ChannelsSelfTest.pptx
+++ b/Channels/ChannelsSelfTest.pptx
@@ -6580,7 +6580,7 @@
           <a:p>
             <a:r>
               <a:rPr lang="en-US" sz="2800" b="1" dirty="0" smtClean="0"/>
-              <a:t>Timestamp 1</a:t>
+              <a:t>Timestamp 4</a:t>
             </a:r>
             <a:endParaRPr lang="en-US" sz="2800" b="1" dirty="0"/>
           </a:p>
@@ -6591,14 +6591,14 @@
           <p:cNvPr id="25" name="Straight Arrow Connector 24"/>
           <p:cNvCxnSpPr>
             <a:stCxn id="24" idx="2"/>
-            <a:endCxn id="2" idx="0"/>
+            <a:endCxn id="30" idx="0"/>
           </p:cNvCxnSpPr>
           <p:nvPr/>
         </p:nvCxnSpPr>
         <p:spPr>
           <a:xfrm flipH="1">
-            <a:off x="711510" y="938091"/>
-            <a:ext cx="1158193" cy="677716"/>
+            <a:off x="1434713" y="938091"/>
+            <a:ext cx="434990" cy="677716"/>
           </a:xfrm>
           <a:prstGeom prst="straightConnector1">
             <a:avLst/>
@@ -6651,11 +6651,7 @@
             </a:r>
             <a:r>
               <a:rPr lang="en-US" sz="2800" b="1" dirty="0" smtClean="0"/>
-              <a:t> </a:t>
-            </a:r>
-            <a:r>
-              <a:rPr lang="en-US" sz="2800" b="1" dirty="0"/>
-              <a:t>4</a:t>
+              <a:t> 3</a:t>
             </a:r>
             <a:endParaRPr lang="en-US" sz="2800" b="1" dirty="0"/>
           </a:p>
@@ -7645,7 +7641,7 @@
         <p:spPr>
           <a:xfrm>
             <a:off x="811485" y="414871"/>
-            <a:ext cx="2116435" cy="523220"/>
+            <a:ext cx="1652866" cy="523220"/>
           </a:xfrm>
           <a:prstGeom prst="rect">
             <a:avLst/>
@@ -7660,7 +7656,7 @@
           <a:p>
             <a:r>
               <a:rPr lang="en-US" sz="2800" b="1" dirty="0" smtClean="0"/>
-              <a:t>Timestamp 1</a:t>
+              <a:t>Event id 1</a:t>
             </a:r>
             <a:endParaRPr lang="en-US" sz="2800" b="1" dirty="0"/>
           </a:p>
@@ -7678,7 +7674,7 @@
         <p:spPr>
           <a:xfrm flipH="1">
             <a:off x="711510" y="938091"/>
-            <a:ext cx="1158193" cy="677716"/>
+            <a:ext cx="926408" cy="677716"/>
           </a:xfrm>
           <a:prstGeom prst="straightConnector1">
             <a:avLst/>
@@ -7712,7 +7708,7 @@
         <p:spPr>
           <a:xfrm>
             <a:off x="3456497" y="5450886"/>
-            <a:ext cx="2116435" cy="523220"/>
+            <a:ext cx="1652866" cy="523220"/>
           </a:xfrm>
           <a:prstGeom prst="rect">
             <a:avLst/>
@@ -7727,15 +7723,7 @@
           <a:p>
             <a:r>
               <a:rPr lang="en-US" sz="2800" b="1" dirty="0" smtClean="0"/>
-              <a:t>Timestamp</a:t>
-            </a:r>
-            <a:r>
-              <a:rPr lang="en-US" sz="2800" b="1" dirty="0" smtClean="0"/>
-              <a:t> </a:t>
-            </a:r>
-            <a:r>
-              <a:rPr lang="en-US" sz="2800" b="1" dirty="0"/>
-              <a:t>4</a:t>
+              <a:t>Event id 6</a:t>
             </a:r>
             <a:endParaRPr lang="en-US" sz="2800" b="1" dirty="0"/>
           </a:p>
@@ -7751,9 +7739,9 @@
           <p:nvPr/>
         </p:nvCxnSpPr>
         <p:spPr>
-          <a:xfrm flipH="1" flipV="1">
-            <a:off x="4371722" y="4641701"/>
-            <a:ext cx="142993" cy="809185"/>
+          <a:xfrm flipV="1">
+            <a:off x="4282930" y="4641701"/>
+            <a:ext cx="88792" cy="809185"/>
           </a:xfrm>
           <a:prstGeom prst="straightConnector1">
             <a:avLst/>

</xml_diff>